<commit_message>
Edward Edited acceptance criteria
</commit_message>
<xml_diff>
--- a/Documentation/Accpetance Criteria & User Stories/User Stories Final Format.pptx
+++ b/Documentation/Accpetance Criteria & User Stories/User Stories Final Format.pptx
@@ -4,6 +4,9 @@
   <p:sldMasterIdLst>
     <p:sldMasterId id="2147483648" r:id="rId1"/>
   </p:sldMasterIdLst>
+  <p:notesMasterIdLst>
+    <p:notesMasterId r:id="rId40"/>
+  </p:notesMasterIdLst>
   <p:sldIdLst>
     <p:sldId id="260" r:id="rId2"/>
     <p:sldId id="256" r:id="rId3"/>
@@ -160,6 +163,440 @@
 </p:presentation>
 </file>
 
+<file path=ppt/notesMasters/notesMaster1.xml><?xml version="1.0" encoding="utf-8"?>
+<p:notesMaster xmlns:a="http://schemas.openxmlformats.org/drawingml/2006/main" xmlns:r="http://schemas.openxmlformats.org/officeDocument/2006/relationships" xmlns:p="http://schemas.openxmlformats.org/presentationml/2006/main">
+  <p:cSld>
+    <p:bg>
+      <p:bgRef idx="1001">
+        <a:schemeClr val="bg1"/>
+      </p:bgRef>
+    </p:bg>
+    <p:spTree>
+      <p:nvGrpSpPr>
+        <p:cNvPr id="1" name=""/>
+        <p:cNvGrpSpPr/>
+        <p:nvPr/>
+      </p:nvGrpSpPr>
+      <p:grpSpPr>
+        <a:xfrm>
+          <a:off x="0" y="0"/>
+          <a:ext cx="0" cy="0"/>
+          <a:chOff x="0" y="0"/>
+          <a:chExt cx="0" cy="0"/>
+        </a:xfrm>
+      </p:grpSpPr>
+      <p:sp>
+        <p:nvSpPr>
+          <p:cNvPr id="2" name="Header Placeholder 1"/>
+          <p:cNvSpPr>
+            <a:spLocks noGrp="1"/>
+          </p:cNvSpPr>
+          <p:nvPr>
+            <p:ph type="hdr" sz="quarter"/>
+          </p:nvPr>
+        </p:nvSpPr>
+        <p:spPr>
+          <a:xfrm>
+            <a:off x="0" y="0"/>
+            <a:ext cx="2971800" cy="458788"/>
+          </a:xfrm>
+          <a:prstGeom prst="rect">
+            <a:avLst/>
+          </a:prstGeom>
+        </p:spPr>
+        <p:txBody>
+          <a:bodyPr vert="horz" lIns="91440" tIns="45720" rIns="91440" bIns="45720" rtlCol="0"/>
+          <a:lstStyle>
+            <a:lvl1pPr algn="l">
+              <a:defRPr sz="1200"/>
+            </a:lvl1pPr>
+          </a:lstStyle>
+          <a:p>
+            <a:endParaRPr lang="en-AU"/>
+          </a:p>
+        </p:txBody>
+      </p:sp>
+      <p:sp>
+        <p:nvSpPr>
+          <p:cNvPr id="3" name="Date Placeholder 2"/>
+          <p:cNvSpPr>
+            <a:spLocks noGrp="1"/>
+          </p:cNvSpPr>
+          <p:nvPr>
+            <p:ph type="dt" idx="1"/>
+          </p:nvPr>
+        </p:nvSpPr>
+        <p:spPr>
+          <a:xfrm>
+            <a:off x="3884613" y="0"/>
+            <a:ext cx="2971800" cy="458788"/>
+          </a:xfrm>
+          <a:prstGeom prst="rect">
+            <a:avLst/>
+          </a:prstGeom>
+        </p:spPr>
+        <p:txBody>
+          <a:bodyPr vert="horz" lIns="91440" tIns="45720" rIns="91440" bIns="45720" rtlCol="0"/>
+          <a:lstStyle>
+            <a:lvl1pPr algn="r">
+              <a:defRPr sz="1200"/>
+            </a:lvl1pPr>
+          </a:lstStyle>
+          <a:p>
+            <a:fld id="{9A500E20-24B3-4630-AB40-4E37534F8118}" type="datetimeFigureOut">
+              <a:rPr lang="en-AU" smtClean="0"/>
+              <a:t>21/08/2016</a:t>
+            </a:fld>
+            <a:endParaRPr lang="en-AU"/>
+          </a:p>
+        </p:txBody>
+      </p:sp>
+      <p:sp>
+        <p:nvSpPr>
+          <p:cNvPr id="4" name="Slide Image Placeholder 3"/>
+          <p:cNvSpPr>
+            <a:spLocks noGrp="1" noRot="1" noChangeAspect="1"/>
+          </p:cNvSpPr>
+          <p:nvPr>
+            <p:ph type="sldImg" idx="2"/>
+          </p:nvPr>
+        </p:nvSpPr>
+        <p:spPr>
+          <a:xfrm>
+            <a:off x="1200150" y="1143000"/>
+            <a:ext cx="4457700" cy="3086100"/>
+          </a:xfrm>
+          <a:prstGeom prst="rect">
+            <a:avLst/>
+          </a:prstGeom>
+          <a:noFill/>
+          <a:ln w="12700">
+            <a:solidFill>
+              <a:prstClr val="black"/>
+            </a:solidFill>
+          </a:ln>
+        </p:spPr>
+        <p:txBody>
+          <a:bodyPr vert="horz" lIns="91440" tIns="45720" rIns="91440" bIns="45720" rtlCol="0" anchor="ctr"/>
+          <a:lstStyle/>
+          <a:p>
+            <a:endParaRPr lang="en-AU"/>
+          </a:p>
+        </p:txBody>
+      </p:sp>
+      <p:sp>
+        <p:nvSpPr>
+          <p:cNvPr id="5" name="Notes Placeholder 4"/>
+          <p:cNvSpPr>
+            <a:spLocks noGrp="1"/>
+          </p:cNvSpPr>
+          <p:nvPr>
+            <p:ph type="body" sz="quarter" idx="3"/>
+          </p:nvPr>
+        </p:nvSpPr>
+        <p:spPr>
+          <a:xfrm>
+            <a:off x="685800" y="4400550"/>
+            <a:ext cx="5486400" cy="3600450"/>
+          </a:xfrm>
+          <a:prstGeom prst="rect">
+            <a:avLst/>
+          </a:prstGeom>
+        </p:spPr>
+        <p:txBody>
+          <a:bodyPr vert="horz" lIns="91440" tIns="45720" rIns="91440" bIns="45720" rtlCol="0"/>
+          <a:lstStyle/>
+          <a:p>
+            <a:pPr lvl="0"/>
+            <a:r>
+              <a:rPr lang="en-US" smtClean="0"/>
+              <a:t>Click to edit Master text styles</a:t>
+            </a:r>
+          </a:p>
+          <a:p>
+            <a:pPr lvl="1"/>
+            <a:r>
+              <a:rPr lang="en-US" smtClean="0"/>
+              <a:t>Second level</a:t>
+            </a:r>
+          </a:p>
+          <a:p>
+            <a:pPr lvl="2"/>
+            <a:r>
+              <a:rPr lang="en-US" smtClean="0"/>
+              <a:t>Third level</a:t>
+            </a:r>
+          </a:p>
+          <a:p>
+            <a:pPr lvl="3"/>
+            <a:r>
+              <a:rPr lang="en-US" smtClean="0"/>
+              <a:t>Fourth level</a:t>
+            </a:r>
+          </a:p>
+          <a:p>
+            <a:pPr lvl="4"/>
+            <a:r>
+              <a:rPr lang="en-US" smtClean="0"/>
+              <a:t>Fifth level</a:t>
+            </a:r>
+            <a:endParaRPr lang="en-AU"/>
+          </a:p>
+        </p:txBody>
+      </p:sp>
+      <p:sp>
+        <p:nvSpPr>
+          <p:cNvPr id="6" name="Footer Placeholder 5"/>
+          <p:cNvSpPr>
+            <a:spLocks noGrp="1"/>
+          </p:cNvSpPr>
+          <p:nvPr>
+            <p:ph type="ftr" sz="quarter" idx="4"/>
+          </p:nvPr>
+        </p:nvSpPr>
+        <p:spPr>
+          <a:xfrm>
+            <a:off x="0" y="8685213"/>
+            <a:ext cx="2971800" cy="458787"/>
+          </a:xfrm>
+          <a:prstGeom prst="rect">
+            <a:avLst/>
+          </a:prstGeom>
+        </p:spPr>
+        <p:txBody>
+          <a:bodyPr vert="horz" lIns="91440" tIns="45720" rIns="91440" bIns="45720" rtlCol="0" anchor="b"/>
+          <a:lstStyle>
+            <a:lvl1pPr algn="l">
+              <a:defRPr sz="1200"/>
+            </a:lvl1pPr>
+          </a:lstStyle>
+          <a:p>
+            <a:endParaRPr lang="en-AU"/>
+          </a:p>
+        </p:txBody>
+      </p:sp>
+      <p:sp>
+        <p:nvSpPr>
+          <p:cNvPr id="7" name="Slide Number Placeholder 6"/>
+          <p:cNvSpPr>
+            <a:spLocks noGrp="1"/>
+          </p:cNvSpPr>
+          <p:nvPr>
+            <p:ph type="sldNum" sz="quarter" idx="5"/>
+          </p:nvPr>
+        </p:nvSpPr>
+        <p:spPr>
+          <a:xfrm>
+            <a:off x="3884613" y="8685213"/>
+            <a:ext cx="2971800" cy="458787"/>
+          </a:xfrm>
+          <a:prstGeom prst="rect">
+            <a:avLst/>
+          </a:prstGeom>
+        </p:spPr>
+        <p:txBody>
+          <a:bodyPr vert="horz" lIns="91440" tIns="45720" rIns="91440" bIns="45720" rtlCol="0" anchor="b"/>
+          <a:lstStyle>
+            <a:lvl1pPr algn="r">
+              <a:defRPr sz="1200"/>
+            </a:lvl1pPr>
+          </a:lstStyle>
+          <a:p>
+            <a:fld id="{29181B7F-56B5-4437-B8E9-5C204CC10ADF}" type="slidenum">
+              <a:rPr lang="en-AU" smtClean="0"/>
+              <a:t>‹#›</a:t>
+            </a:fld>
+            <a:endParaRPr lang="en-AU"/>
+          </a:p>
+        </p:txBody>
+      </p:sp>
+    </p:spTree>
+    <p:extLst>
+      <p:ext uri="{BB962C8B-B14F-4D97-AF65-F5344CB8AC3E}">
+        <p14:creationId xmlns:p14="http://schemas.microsoft.com/office/powerpoint/2010/main" val="755815436"/>
+      </p:ext>
+    </p:extLst>
+  </p:cSld>
+  <p:clrMap bg1="lt1" tx1="dk1" bg2="lt2" tx2="dk2" accent1="accent1" accent2="accent2" accent3="accent3" accent4="accent4" accent5="accent5" accent6="accent6" hlink="hlink" folHlink="folHlink"/>
+  <p:notesStyle>
+    <a:lvl1pPr marL="0" algn="l" defTabSz="914400" rtl="0" eaLnBrk="1" latinLnBrk="0" hangingPunct="1">
+      <a:defRPr sz="1200" kern="1200">
+        <a:solidFill>
+          <a:schemeClr val="tx1"/>
+        </a:solidFill>
+        <a:latin typeface="+mn-lt"/>
+        <a:ea typeface="+mn-ea"/>
+        <a:cs typeface="+mn-cs"/>
+      </a:defRPr>
+    </a:lvl1pPr>
+    <a:lvl2pPr marL="457200" algn="l" defTabSz="914400" rtl="0" eaLnBrk="1" latinLnBrk="0" hangingPunct="1">
+      <a:defRPr sz="1200" kern="1200">
+        <a:solidFill>
+          <a:schemeClr val="tx1"/>
+        </a:solidFill>
+        <a:latin typeface="+mn-lt"/>
+        <a:ea typeface="+mn-ea"/>
+        <a:cs typeface="+mn-cs"/>
+      </a:defRPr>
+    </a:lvl2pPr>
+    <a:lvl3pPr marL="914400" algn="l" defTabSz="914400" rtl="0" eaLnBrk="1" latinLnBrk="0" hangingPunct="1">
+      <a:defRPr sz="1200" kern="1200">
+        <a:solidFill>
+          <a:schemeClr val="tx1"/>
+        </a:solidFill>
+        <a:latin typeface="+mn-lt"/>
+        <a:ea typeface="+mn-ea"/>
+        <a:cs typeface="+mn-cs"/>
+      </a:defRPr>
+    </a:lvl3pPr>
+    <a:lvl4pPr marL="1371600" algn="l" defTabSz="914400" rtl="0" eaLnBrk="1" latinLnBrk="0" hangingPunct="1">
+      <a:defRPr sz="1200" kern="1200">
+        <a:solidFill>
+          <a:schemeClr val="tx1"/>
+        </a:solidFill>
+        <a:latin typeface="+mn-lt"/>
+        <a:ea typeface="+mn-ea"/>
+        <a:cs typeface="+mn-cs"/>
+      </a:defRPr>
+    </a:lvl4pPr>
+    <a:lvl5pPr marL="1828800" algn="l" defTabSz="914400" rtl="0" eaLnBrk="1" latinLnBrk="0" hangingPunct="1">
+      <a:defRPr sz="1200" kern="1200">
+        <a:solidFill>
+          <a:schemeClr val="tx1"/>
+        </a:solidFill>
+        <a:latin typeface="+mn-lt"/>
+        <a:ea typeface="+mn-ea"/>
+        <a:cs typeface="+mn-cs"/>
+      </a:defRPr>
+    </a:lvl5pPr>
+    <a:lvl6pPr marL="2286000" algn="l" defTabSz="914400" rtl="0" eaLnBrk="1" latinLnBrk="0" hangingPunct="1">
+      <a:defRPr sz="1200" kern="1200">
+        <a:solidFill>
+          <a:schemeClr val="tx1"/>
+        </a:solidFill>
+        <a:latin typeface="+mn-lt"/>
+        <a:ea typeface="+mn-ea"/>
+        <a:cs typeface="+mn-cs"/>
+      </a:defRPr>
+    </a:lvl6pPr>
+    <a:lvl7pPr marL="2743200" algn="l" defTabSz="914400" rtl="0" eaLnBrk="1" latinLnBrk="0" hangingPunct="1">
+      <a:defRPr sz="1200" kern="1200">
+        <a:solidFill>
+          <a:schemeClr val="tx1"/>
+        </a:solidFill>
+        <a:latin typeface="+mn-lt"/>
+        <a:ea typeface="+mn-ea"/>
+        <a:cs typeface="+mn-cs"/>
+      </a:defRPr>
+    </a:lvl7pPr>
+    <a:lvl8pPr marL="3200400" algn="l" defTabSz="914400" rtl="0" eaLnBrk="1" latinLnBrk="0" hangingPunct="1">
+      <a:defRPr sz="1200" kern="1200">
+        <a:solidFill>
+          <a:schemeClr val="tx1"/>
+        </a:solidFill>
+        <a:latin typeface="+mn-lt"/>
+        <a:ea typeface="+mn-ea"/>
+        <a:cs typeface="+mn-cs"/>
+      </a:defRPr>
+    </a:lvl8pPr>
+    <a:lvl9pPr marL="3657600" algn="l" defTabSz="914400" rtl="0" eaLnBrk="1" latinLnBrk="0" hangingPunct="1">
+      <a:defRPr sz="1200" kern="1200">
+        <a:solidFill>
+          <a:schemeClr val="tx1"/>
+        </a:solidFill>
+        <a:latin typeface="+mn-lt"/>
+        <a:ea typeface="+mn-ea"/>
+        <a:cs typeface="+mn-cs"/>
+      </a:defRPr>
+    </a:lvl9pPr>
+  </p:notesStyle>
+</p:notesMaster>
+</file>
+
+<file path=ppt/notesSlides/notesSlide1.xml><?xml version="1.0" encoding="utf-8"?>
+<p:notes xmlns:a="http://schemas.openxmlformats.org/drawingml/2006/main" xmlns:r="http://schemas.openxmlformats.org/officeDocument/2006/relationships" xmlns:p="http://schemas.openxmlformats.org/presentationml/2006/main">
+  <p:cSld>
+    <p:spTree>
+      <p:nvGrpSpPr>
+        <p:cNvPr id="1" name=""/>
+        <p:cNvGrpSpPr/>
+        <p:nvPr/>
+      </p:nvGrpSpPr>
+      <p:grpSpPr>
+        <a:xfrm>
+          <a:off x="0" y="0"/>
+          <a:ext cx="0" cy="0"/>
+          <a:chOff x="0" y="0"/>
+          <a:chExt cx="0" cy="0"/>
+        </a:xfrm>
+      </p:grpSpPr>
+      <p:sp>
+        <p:nvSpPr>
+          <p:cNvPr id="2" name="Slide Image Placeholder 1"/>
+          <p:cNvSpPr>
+            <a:spLocks noGrp="1" noRot="1" noChangeAspect="1"/>
+          </p:cNvSpPr>
+          <p:nvPr>
+            <p:ph type="sldImg"/>
+          </p:nvPr>
+        </p:nvSpPr>
+        <p:spPr/>
+      </p:sp>
+      <p:sp>
+        <p:nvSpPr>
+          <p:cNvPr id="3" name="Notes Placeholder 2"/>
+          <p:cNvSpPr>
+            <a:spLocks noGrp="1"/>
+          </p:cNvSpPr>
+          <p:nvPr>
+            <p:ph type="body" idx="1"/>
+          </p:nvPr>
+        </p:nvSpPr>
+        <p:spPr/>
+        <p:txBody>
+          <a:bodyPr/>
+          <a:lstStyle/>
+          <a:p>
+            <a:endParaRPr lang="en-AU" dirty="0"/>
+          </a:p>
+        </p:txBody>
+      </p:sp>
+      <p:sp>
+        <p:nvSpPr>
+          <p:cNvPr id="4" name="Slide Number Placeholder 3"/>
+          <p:cNvSpPr>
+            <a:spLocks noGrp="1"/>
+          </p:cNvSpPr>
+          <p:nvPr>
+            <p:ph type="sldNum" sz="quarter" idx="10"/>
+          </p:nvPr>
+        </p:nvSpPr>
+        <p:spPr/>
+        <p:txBody>
+          <a:bodyPr/>
+          <a:lstStyle/>
+          <a:p>
+            <a:fld id="{29181B7F-56B5-4437-B8E9-5C204CC10ADF}" type="slidenum">
+              <a:rPr lang="en-AU" smtClean="0"/>
+              <a:t>32</a:t>
+            </a:fld>
+            <a:endParaRPr lang="en-AU"/>
+          </a:p>
+        </p:txBody>
+      </p:sp>
+    </p:spTree>
+    <p:extLst>
+      <p:ext uri="{BB962C8B-B14F-4D97-AF65-F5344CB8AC3E}">
+        <p14:creationId xmlns:p14="http://schemas.microsoft.com/office/powerpoint/2010/main" val="3618736908"/>
+      </p:ext>
+    </p:extLst>
+  </p:cSld>
+  <p:clrMapOvr>
+    <a:masterClrMapping/>
+  </p:clrMapOvr>
+</p:notes>
+</file>
+
 <file path=ppt/slideLayouts/slideLayout1.xml><?xml version="1.0" encoding="utf-8"?>
 <p:sldLayout xmlns:a="http://schemas.openxmlformats.org/drawingml/2006/main" xmlns:r="http://schemas.openxmlformats.org/officeDocument/2006/relationships" xmlns:p="http://schemas.openxmlformats.org/presentationml/2006/main" type="title" preserve="1">
   <p:cSld name="Title Slide">
@@ -3941,7 +4378,7 @@
           <a:lstStyle/>
           <a:p>
             <a:r>
-              <a:rPr lang="en-AU" sz="2000" dirty="0">
+              <a:rPr lang="en-AU" sz="2000" dirty="0" smtClean="0">
                 <a:solidFill>
                   <a:schemeClr val="tx1"/>
                 </a:solidFill>
@@ -3955,13 +4392,75 @@
               <a:buChar char="•"/>
             </a:pPr>
             <a:r>
-              <a:rPr lang="en-AU" sz="2000" dirty="0">
+              <a:rPr lang="en-AU" sz="2000" dirty="0" smtClean="0">
                 <a:solidFill>
                   <a:schemeClr val="tx1"/>
                 </a:solidFill>
               </a:rPr>
               <a:t>Given I have predetermined classes when I go to check the class times then it should show the timetable with all classes available. </a:t>
             </a:r>
+          </a:p>
+          <a:p>
+            <a:pPr marL="342900" indent="-342900">
+              <a:buFont typeface="Arial" panose="020B0604020202020204" pitchFamily="34" charset="0"/>
+              <a:buChar char="•"/>
+            </a:pPr>
+            <a:r>
+              <a:rPr lang="en-AU" sz="2000" dirty="0">
+                <a:solidFill>
+                  <a:schemeClr val="tx1"/>
+                </a:solidFill>
+              </a:rPr>
+              <a:t>G</a:t>
+            </a:r>
+            <a:r>
+              <a:rPr lang="en-AU" sz="2000" dirty="0" smtClean="0">
+                <a:solidFill>
+                  <a:schemeClr val="tx1"/>
+                </a:solidFill>
+              </a:rPr>
+              <a:t>iven </a:t>
+            </a:r>
+            <a:r>
+              <a:rPr lang="en-AU" sz="2000" dirty="0">
+                <a:solidFill>
+                  <a:schemeClr val="tx1"/>
+                </a:solidFill>
+              </a:rPr>
+              <a:t>I have classes at certain times when I need to teach that class then I should be able to view the timetable to verify the location through the application. </a:t>
+            </a:r>
+          </a:p>
+          <a:p>
+            <a:r>
+              <a:rPr lang="en-AU" sz="2000" dirty="0">
+                <a:solidFill>
+                  <a:schemeClr val="tx1"/>
+                </a:solidFill>
+              </a:rPr>
+              <a:t> </a:t>
+            </a:r>
+          </a:p>
+          <a:p>
+            <a:pPr marL="179388" indent="-179388">
+              <a:buFont typeface="Arial" pitchFamily="34" charset="0"/>
+              <a:buChar char="•"/>
+            </a:pPr>
+            <a:endParaRPr lang="en-AU" sz="2000" dirty="0" smtClean="0">
+              <a:solidFill>
+                <a:schemeClr val="tx1"/>
+              </a:solidFill>
+            </a:endParaRPr>
+          </a:p>
+          <a:p>
+            <a:pPr marL="179388" indent="-179388">
+              <a:buFont typeface="Arial" pitchFamily="34" charset="0"/>
+              <a:buChar char="•"/>
+            </a:pPr>
+            <a:endParaRPr lang="en-AU" sz="2000" dirty="0">
+              <a:solidFill>
+                <a:schemeClr val="tx1"/>
+              </a:solidFill>
+            </a:endParaRPr>
           </a:p>
         </p:txBody>
       </p:sp>
@@ -5847,6 +6346,36 @@
               </a:rPr>
               <a:t>Given I am looking for a job when I look to contact the principle then I should be able to do this either through the system or via email without errors. </a:t>
             </a:r>
+            <a:endParaRPr lang="en-AU" sz="2000" dirty="0" smtClean="0">
+              <a:solidFill>
+                <a:schemeClr val="tx1"/>
+              </a:solidFill>
+            </a:endParaRPr>
+          </a:p>
+          <a:p>
+            <a:pPr marL="342900" indent="-342900">
+              <a:buFont typeface="Arial" panose="020B0604020202020204" pitchFamily="34" charset="0"/>
+              <a:buChar char="•"/>
+            </a:pPr>
+            <a:r>
+              <a:rPr lang="en-AU" sz="2000" dirty="0">
+                <a:solidFill>
+                  <a:schemeClr val="tx1"/>
+                </a:solidFill>
+              </a:rPr>
+              <a:t>Given I am looking for a job when I look for contact details then I need to be able to view them through the application. </a:t>
+            </a:r>
+          </a:p>
+          <a:p>
+            <a:pPr marL="342900" indent="-342900">
+              <a:buFont typeface="Arial" panose="020B0604020202020204" pitchFamily="34" charset="0"/>
+              <a:buChar char="•"/>
+            </a:pPr>
+            <a:endParaRPr lang="en-AU" sz="2000" dirty="0">
+              <a:solidFill>
+                <a:schemeClr val="tx1"/>
+              </a:solidFill>
+            </a:endParaRPr>
           </a:p>
         </p:txBody>
       </p:sp>
@@ -6319,6 +6848,36 @@
               </a:rPr>
               <a:t>Given My student is continuing When I go to plan lesson then I should be able to include challenging stimulus to engage the continuing student further. </a:t>
             </a:r>
+            <a:endParaRPr lang="en-AU" sz="2000" dirty="0" smtClean="0">
+              <a:solidFill>
+                <a:schemeClr val="tx1"/>
+              </a:solidFill>
+            </a:endParaRPr>
+          </a:p>
+          <a:p>
+            <a:pPr marL="342900" indent="-342900">
+              <a:buFont typeface="Arial" panose="020B0604020202020204" pitchFamily="34" charset="0"/>
+              <a:buChar char="•"/>
+            </a:pPr>
+            <a:r>
+              <a:rPr lang="en-AU" sz="2000" dirty="0">
+                <a:solidFill>
+                  <a:schemeClr val="tx1"/>
+                </a:solidFill>
+              </a:rPr>
+              <a:t>Given a student may be continuing when I look at that students information then I should be able to see this clearly. </a:t>
+            </a:r>
+          </a:p>
+          <a:p>
+            <a:pPr marL="342900" indent="-342900">
+              <a:buFont typeface="Arial" panose="020B0604020202020204" pitchFamily="34" charset="0"/>
+              <a:buChar char="•"/>
+            </a:pPr>
+            <a:endParaRPr lang="en-AU" sz="2000" dirty="0">
+              <a:solidFill>
+                <a:schemeClr val="tx1"/>
+              </a:solidFill>
+            </a:endParaRPr>
           </a:p>
         </p:txBody>
       </p:sp>
@@ -6741,8 +7300,8 @@
         </p:nvSpPr>
         <p:spPr>
           <a:xfrm>
-            <a:off x="78000" y="928434"/>
-            <a:ext cx="9828000" cy="1501945"/>
+            <a:off x="0" y="928435"/>
+            <a:ext cx="9906000" cy="991806"/>
           </a:xfrm>
           <a:prstGeom prst="rect">
             <a:avLst/>
@@ -6800,8 +7359,8 @@
         </p:nvSpPr>
         <p:spPr>
           <a:xfrm>
-            <a:off x="39153" y="2603439"/>
-            <a:ext cx="9828000" cy="2352091"/>
+            <a:off x="39153" y="2093303"/>
+            <a:ext cx="9828000" cy="3735998"/>
           </a:xfrm>
           <a:prstGeom prst="rect">
             <a:avLst/>
@@ -6860,8 +7419,53 @@
                   <a:schemeClr val="tx1"/>
                 </a:solidFill>
               </a:rPr>
-              <a:t>I can log using a special administrator account, with privileges only I can access</a:t>
-            </a:r>
+              <a:t>Given that I am an </a:t>
+            </a:r>
+            <a:r>
+              <a:rPr lang="en-AU" sz="2000" dirty="0" err="1">
+                <a:solidFill>
+                  <a:schemeClr val="tx1"/>
+                </a:solidFill>
+              </a:rPr>
+              <a:t>adminstrator</a:t>
+            </a:r>
+            <a:r>
+              <a:rPr lang="en-AU" sz="2000" dirty="0">
+                <a:solidFill>
+                  <a:schemeClr val="tx1"/>
+                </a:solidFill>
+              </a:rPr>
+              <a:t> when I log into the application then I should have a view of the application with special </a:t>
+            </a:r>
+            <a:r>
+              <a:rPr lang="en-AU" sz="2000" dirty="0" err="1">
+                <a:solidFill>
+                  <a:schemeClr val="tx1"/>
+                </a:solidFill>
+              </a:rPr>
+              <a:t>priveliges</a:t>
+            </a:r>
+            <a:r>
+              <a:rPr lang="en-AU" sz="2000" dirty="0">
+                <a:solidFill>
+                  <a:schemeClr val="tx1"/>
+                </a:solidFill>
+              </a:rPr>
+              <a:t> which only I can access</a:t>
+            </a:r>
+            <a:r>
+              <a:rPr lang="en-AU" sz="2000" dirty="0" smtClean="0">
+                <a:solidFill>
+                  <a:schemeClr val="tx1"/>
+                </a:solidFill>
+              </a:rPr>
+              <a:t>.</a:t>
+            </a:r>
+            <a:endParaRPr lang="en-AU" sz="2000" dirty="0">
+              <a:solidFill>
+                <a:schemeClr val="tx1"/>
+              </a:solidFill>
+            </a:endParaRPr>
           </a:p>
           <a:p>
             <a:pPr marL="342900" indent="-342900">
@@ -6874,7 +7478,7 @@
                   <a:schemeClr val="tx1"/>
                 </a:solidFill>
               </a:rPr>
-              <a:t>I have a special place where I can receive information about if someone wants to change appointment details</a:t>
+              <a:t>Given I need to find information when I am doing a task then I should be able to have a special place where I can receive information about changes and other information through the application. </a:t>
             </a:r>
           </a:p>
           <a:p>
@@ -6888,7 +7492,35 @@
                   <a:schemeClr val="tx1"/>
                 </a:solidFill>
               </a:rPr>
-              <a:t>I have the ability to change the required appointment details or cancel altogether using a form that prefills with data that I then change</a:t>
+              <a:t>Given I need to be able to edit or cancel appointment details when I go to the specific appointment then I should have the option to edit or </a:t>
+            </a:r>
+            <a:r>
+              <a:rPr lang="en-AU" sz="2000" dirty="0" err="1">
+                <a:solidFill>
+                  <a:schemeClr val="tx1"/>
+                </a:solidFill>
+              </a:rPr>
+              <a:t>cancil</a:t>
+            </a:r>
+            <a:r>
+              <a:rPr lang="en-AU" sz="2000" dirty="0">
+                <a:solidFill>
+                  <a:schemeClr val="tx1"/>
+                </a:solidFill>
+              </a:rPr>
+              <a:t> </a:t>
+            </a:r>
+            <a:r>
+              <a:rPr lang="en-AU" sz="2000" dirty="0"/>
+              <a:t>these appointments via the </a:t>
+            </a:r>
+            <a:r>
+              <a:rPr lang="en-AU" sz="2000" dirty="0">
+                <a:solidFill>
+                  <a:schemeClr val="tx1"/>
+                </a:solidFill>
+              </a:rPr>
+              <a:t>application.  </a:t>
             </a:r>
           </a:p>
           <a:p>
@@ -6902,7 +7534,7 @@
                   <a:schemeClr val="tx1"/>
                 </a:solidFill>
               </a:rPr>
-              <a:t>The application has an area where the user can request changes</a:t>
+              <a:t>Given someone needs to request a change when I go to view change requests then there should be an area containing these change requests via the application.  </a:t>
             </a:r>
           </a:p>
           <a:p>
@@ -7056,8 +7688,8 @@
         </p:nvSpPr>
         <p:spPr>
           <a:xfrm>
-            <a:off x="39153" y="5128590"/>
-            <a:ext cx="9828000" cy="1620000"/>
+            <a:off x="78000" y="5989320"/>
+            <a:ext cx="9789152" cy="759270"/>
           </a:xfrm>
           <a:prstGeom prst="rect">
             <a:avLst/>
@@ -8238,8 +8870,8 @@
         </p:nvSpPr>
         <p:spPr>
           <a:xfrm>
-            <a:off x="78000" y="928434"/>
-            <a:ext cx="9828000" cy="1501945"/>
+            <a:off x="77999" y="928435"/>
+            <a:ext cx="9828001" cy="1197546"/>
           </a:xfrm>
           <a:prstGeom prst="rect">
             <a:avLst/>
@@ -8297,8 +8929,8 @@
         </p:nvSpPr>
         <p:spPr>
           <a:xfrm>
-            <a:off x="39153" y="2603439"/>
-            <a:ext cx="9828000" cy="2352091"/>
+            <a:off x="77999" y="2299043"/>
+            <a:ext cx="9789154" cy="3735998"/>
           </a:xfrm>
           <a:prstGeom prst="rect">
             <a:avLst/>
@@ -8357,7 +8989,39 @@
                   <a:schemeClr val="tx1"/>
                 </a:solidFill>
               </a:rPr>
-              <a:t>I can log using a special administrator account, with privileges only I can access</a:t>
+              <a:t>Given that I am an </a:t>
+            </a:r>
+            <a:r>
+              <a:rPr lang="en-AU" sz="2000" dirty="0" err="1">
+                <a:solidFill>
+                  <a:schemeClr val="tx1"/>
+                </a:solidFill>
+              </a:rPr>
+              <a:t>adminstrator</a:t>
+            </a:r>
+            <a:r>
+              <a:rPr lang="en-AU" sz="2000" dirty="0">
+                <a:solidFill>
+                  <a:schemeClr val="tx1"/>
+                </a:solidFill>
+              </a:rPr>
+              <a:t> when I log into the application then I should have a view of the application with special </a:t>
+            </a:r>
+            <a:r>
+              <a:rPr lang="en-AU" sz="2000" dirty="0" err="1">
+                <a:solidFill>
+                  <a:schemeClr val="tx1"/>
+                </a:solidFill>
+              </a:rPr>
+              <a:t>priveliges</a:t>
+            </a:r>
+            <a:r>
+              <a:rPr lang="en-AU" sz="2000" dirty="0">
+                <a:solidFill>
+                  <a:schemeClr val="tx1"/>
+                </a:solidFill>
+              </a:rPr>
+              <a:t> which only I can access.</a:t>
             </a:r>
           </a:p>
           <a:p>
@@ -8371,7 +9035,23 @@
                   <a:schemeClr val="tx1"/>
                 </a:solidFill>
               </a:rPr>
-              <a:t> I have a special tool that lets me change and organise the timetable </a:t>
+              <a:t> </a:t>
+            </a:r>
+            <a:r>
+              <a:rPr lang="en-AU" sz="2000" dirty="0" smtClean="0">
+                <a:solidFill>
+                  <a:schemeClr val="tx1"/>
+                </a:solidFill>
+              </a:rPr>
+              <a:t>Given </a:t>
+            </a:r>
+            <a:r>
+              <a:rPr lang="en-AU" sz="2000" dirty="0">
+                <a:solidFill>
+                  <a:schemeClr val="tx1"/>
+                </a:solidFill>
+              </a:rPr>
+              <a:t>that I need to be able to change the timetable for any reason when I go to change the timetable then I need to have a special tool through the application which allows for me to organise and change the timetable.</a:t>
             </a:r>
           </a:p>
           <a:p>
@@ -8385,7 +9065,39 @@
                   <a:schemeClr val="tx1"/>
                 </a:solidFill>
               </a:rPr>
-              <a:t>The tool warns me if there are any clashes, such as double booked rooms or a teacher required to be in two places at once</a:t>
+              <a:t> </a:t>
+            </a:r>
+            <a:r>
+              <a:rPr lang="en-AU" sz="2000" dirty="0" smtClean="0">
+                <a:solidFill>
+                  <a:schemeClr val="tx1"/>
+                </a:solidFill>
+              </a:rPr>
+              <a:t>Given </a:t>
+            </a:r>
+            <a:r>
+              <a:rPr lang="en-AU" sz="2000" dirty="0">
+                <a:solidFill>
+                  <a:schemeClr val="tx1"/>
+                </a:solidFill>
+              </a:rPr>
+              <a:t>that </a:t>
+            </a:r>
+            <a:r>
+              <a:rPr lang="en-AU" sz="2000" dirty="0" err="1">
+                <a:solidFill>
+                  <a:schemeClr val="tx1"/>
+                </a:solidFill>
+              </a:rPr>
+              <a:t>i</a:t>
+            </a:r>
+            <a:r>
+              <a:rPr lang="en-AU" sz="2000" dirty="0">
+                <a:solidFill>
+                  <a:schemeClr val="tx1"/>
+                </a:solidFill>
+              </a:rPr>
+              <a:t> need to organise the timetable in a way which does not have clashes when I got to organise the timetable through the tool then I should be notified of any clashes which have occurred. </a:t>
             </a:r>
           </a:p>
           <a:p>
@@ -8399,7 +9111,7 @@
                   <a:schemeClr val="tx1"/>
                 </a:solidFill>
               </a:rPr>
-              <a:t>When I press a finalise button it instantly updates the database so that everyone can see the changes</a:t>
+              <a:t>Given that the timetable needs to be able to be updated to the database/ application so that all may see the changes when I press finalise then it should link straight to the database/ application. </a:t>
             </a:r>
           </a:p>
           <a:p>
@@ -8549,8 +9261,8 @@
         </p:nvSpPr>
         <p:spPr>
           <a:xfrm>
-            <a:off x="39153" y="5128590"/>
-            <a:ext cx="9828000" cy="1620000"/>
+            <a:off x="77999" y="6035040"/>
+            <a:ext cx="9789153" cy="713550"/>
           </a:xfrm>
           <a:prstGeom prst="rect">
             <a:avLst/>
@@ -8818,8 +9530,8 @@
         </p:nvSpPr>
         <p:spPr>
           <a:xfrm>
-            <a:off x="39153" y="2170305"/>
-            <a:ext cx="9828000" cy="2785226"/>
+            <a:off x="78000" y="2170304"/>
+            <a:ext cx="9789152" cy="3476116"/>
           </a:xfrm>
           <a:prstGeom prst="rect">
             <a:avLst/>
@@ -8864,8 +9576,21 @@
                   <a:schemeClr val="tx1"/>
                 </a:solidFill>
               </a:rPr>
-              <a:t>Acceptance criteria</a:t>
-            </a:r>
+              <a:t>Acceptance </a:t>
+            </a:r>
+            <a:r>
+              <a:rPr lang="en-AU" sz="2000" dirty="0" smtClean="0">
+                <a:solidFill>
+                  <a:schemeClr val="tx1"/>
+                </a:solidFill>
+              </a:rPr>
+              <a:t>criteria</a:t>
+            </a:r>
+            <a:endParaRPr lang="en-AU" sz="2000" dirty="0">
+              <a:solidFill>
+                <a:schemeClr val="tx1"/>
+              </a:solidFill>
+            </a:endParaRPr>
           </a:p>
           <a:p>
             <a:pPr marL="342900" indent="-342900">
@@ -8878,8 +9603,53 @@
                   <a:schemeClr val="tx1"/>
                 </a:solidFill>
               </a:rPr>
-              <a:t>I can log using a special administrator account, with privileges only I can access (if no email is used)</a:t>
-            </a:r>
+              <a:t>Given that I am an </a:t>
+            </a:r>
+            <a:r>
+              <a:rPr lang="en-AU" sz="2000" dirty="0" err="1">
+                <a:solidFill>
+                  <a:schemeClr val="tx1"/>
+                </a:solidFill>
+              </a:rPr>
+              <a:t>adminstrator</a:t>
+            </a:r>
+            <a:r>
+              <a:rPr lang="en-AU" sz="2000" dirty="0">
+                <a:solidFill>
+                  <a:schemeClr val="tx1"/>
+                </a:solidFill>
+              </a:rPr>
+              <a:t> when I log into the application then I should have a view of the application with special </a:t>
+            </a:r>
+            <a:r>
+              <a:rPr lang="en-AU" sz="2000" dirty="0" err="1">
+                <a:solidFill>
+                  <a:schemeClr val="tx1"/>
+                </a:solidFill>
+              </a:rPr>
+              <a:t>priveliges</a:t>
+            </a:r>
+            <a:r>
+              <a:rPr lang="en-AU" sz="2000" dirty="0">
+                <a:solidFill>
+                  <a:schemeClr val="tx1"/>
+                </a:solidFill>
+              </a:rPr>
+              <a:t> which only I can access. (If no email is used</a:t>
+            </a:r>
+            <a:r>
+              <a:rPr lang="en-AU" sz="2000" dirty="0" smtClean="0">
+                <a:solidFill>
+                  <a:schemeClr val="tx1"/>
+                </a:solidFill>
+              </a:rPr>
+              <a:t>)</a:t>
+            </a:r>
+            <a:endParaRPr lang="en-AU" sz="2000" dirty="0">
+              <a:solidFill>
+                <a:schemeClr val="tx1"/>
+              </a:solidFill>
+            </a:endParaRPr>
           </a:p>
           <a:p>
             <a:pPr marL="342900" indent="-342900">
@@ -8892,7 +9662,7 @@
                   <a:schemeClr val="tx1"/>
                 </a:solidFill>
               </a:rPr>
-              <a:t>I have a special area where I can receive queries and forward them to other parties (This could be done over email)</a:t>
+              <a:t>Given that I need to be able to receive queries when I go to  the application then there should be a special area that contains these queries. (if email is not used) </a:t>
             </a:r>
           </a:p>
           <a:p>
@@ -8906,7 +9676,7 @@
                   <a:schemeClr val="tx1"/>
                 </a:solidFill>
               </a:rPr>
-              <a:t>The application has an area where the user can send queries to the admin (possibly with a reply email attached) </a:t>
+              <a:t>Given that anyone needs to submit a query when they go to the application then there should be a place which allows for queries to be submitted. (possibly with reply email attached). </a:t>
             </a:r>
           </a:p>
           <a:p>
@@ -8915,12 +9685,20 @@
               <a:buChar char="•"/>
             </a:pPr>
             <a:r>
-              <a:rPr lang="en-AU" sz="2000" dirty="0">
-                <a:solidFill>
-                  <a:schemeClr val="tx1"/>
-                </a:solidFill>
-              </a:rPr>
-              <a:t>I have the ability to forward the message to other parties </a:t>
+              <a:rPr lang="en-AU" sz="2000" dirty="0" smtClean="0">
+                <a:solidFill>
+                  <a:schemeClr val="tx1"/>
+                </a:solidFill>
+              </a:rPr>
+              <a:t>Given </a:t>
+            </a:r>
+            <a:r>
+              <a:rPr lang="en-AU" sz="2000" dirty="0">
+                <a:solidFill>
+                  <a:schemeClr val="tx1"/>
+                </a:solidFill>
+              </a:rPr>
+              <a:t>that I need to forward a message to another staff member when I go to do this then I should be able to forward these messages with a forwarding function. </a:t>
             </a:r>
           </a:p>
         </p:txBody>
@@ -9063,8 +9841,8 @@
         </p:nvSpPr>
         <p:spPr>
           <a:xfrm>
-            <a:off x="39153" y="5128590"/>
-            <a:ext cx="9828000" cy="1620000"/>
+            <a:off x="39153" y="5646420"/>
+            <a:ext cx="9828000" cy="1102170"/>
           </a:xfrm>
           <a:prstGeom prst="rect">
             <a:avLst/>
@@ -9332,8 +10110,8 @@
         </p:nvSpPr>
         <p:spPr>
           <a:xfrm>
-            <a:off x="39153" y="2603439"/>
-            <a:ext cx="9828000" cy="2352091"/>
+            <a:off x="77999" y="2603439"/>
+            <a:ext cx="9789154" cy="3180141"/>
           </a:xfrm>
           <a:prstGeom prst="rect">
             <a:avLst/>
@@ -9392,7 +10170,7 @@
                   <a:schemeClr val="tx1"/>
                 </a:solidFill>
               </a:rPr>
-              <a:t>I have access to a MySQL terminal (can’t easily be done in the app securely, direct access to the server using terminal or workbench for an admin is best option)</a:t>
+              <a:t>Given I need to search the database when I require information for a task then I need to be able to have access to either the terminal or the database.  (Could be hard through application due to security issues)  </a:t>
             </a:r>
           </a:p>
           <a:p>
@@ -9406,7 +10184,7 @@
                   <a:schemeClr val="tx1"/>
                 </a:solidFill>
               </a:rPr>
-              <a:t>If want to do in app must have an area specific to the admin</a:t>
+              <a:t>Given I need to be able to do this via the app when I need information for the task then I need to have a specific area to do so on the application. </a:t>
             </a:r>
           </a:p>
           <a:p>
@@ -9420,7 +10198,23 @@
                   <a:schemeClr val="tx1"/>
                 </a:solidFill>
               </a:rPr>
-              <a:t>This area lets me select which table I want to see </a:t>
+              <a:t>Given I need specific information when performing tasks then I need to be able to </a:t>
+            </a:r>
+            <a:r>
+              <a:rPr lang="en-AU" sz="2000" dirty="0" err="1">
+                <a:solidFill>
+                  <a:schemeClr val="tx1"/>
+                </a:solidFill>
+              </a:rPr>
+              <a:t>selct</a:t>
+            </a:r>
+            <a:r>
+              <a:rPr lang="en-AU" sz="2000" dirty="0">
+                <a:solidFill>
+                  <a:schemeClr val="tx1"/>
+                </a:solidFill>
+              </a:rPr>
+              <a:t> which tables I want to see from the database. </a:t>
             </a:r>
           </a:p>
           <a:p>
@@ -9434,7 +10228,7 @@
                   <a:schemeClr val="tx1"/>
                 </a:solidFill>
               </a:rPr>
-              <a:t>I can then sort by column and search specific columns in the tables</a:t>
+              <a:t>Given when I need to be able to sort through the information when performing a specific task then I will need to be able to search via table and via column. </a:t>
             </a:r>
           </a:p>
           <a:p>
@@ -9584,8 +10378,8 @@
         </p:nvSpPr>
         <p:spPr>
           <a:xfrm>
-            <a:off x="39153" y="5128590"/>
-            <a:ext cx="9828000" cy="1620000"/>
+            <a:off x="77999" y="5783580"/>
+            <a:ext cx="9789153" cy="965010"/>
           </a:xfrm>
           <a:prstGeom prst="rect">
             <a:avLst/>
@@ -9794,8 +10588,8 @@
         </p:nvSpPr>
         <p:spPr>
           <a:xfrm>
-            <a:off x="78000" y="928434"/>
-            <a:ext cx="9828000" cy="1501945"/>
+            <a:off x="39153" y="928435"/>
+            <a:ext cx="9866847" cy="1174686"/>
           </a:xfrm>
           <a:prstGeom prst="rect">
             <a:avLst/>
@@ -9853,8 +10647,8 @@
         </p:nvSpPr>
         <p:spPr>
           <a:xfrm>
-            <a:off x="39153" y="2603439"/>
-            <a:ext cx="9828000" cy="2352091"/>
+            <a:off x="77999" y="2276183"/>
+            <a:ext cx="9789154" cy="3713138"/>
           </a:xfrm>
           <a:prstGeom prst="rect">
             <a:avLst/>
@@ -9913,7 +10707,7 @@
                   <a:schemeClr val="tx1"/>
                 </a:solidFill>
               </a:rPr>
-              <a:t>I have access to a MySQL terminal (can’t easily be done in the app securely, direct access to the server using terminal or workbench for an admin is best option)</a:t>
+              <a:t>Given I need to search the database when I require information for a task then I need to be able to have access to either the terminal or the database.  (Could be hard through application due to security issues) </a:t>
             </a:r>
           </a:p>
           <a:p>
@@ -9927,7 +10721,7 @@
                   <a:schemeClr val="tx1"/>
                 </a:solidFill>
               </a:rPr>
-              <a:t>If want to do in app must have an area specific to the admin</a:t>
+              <a:t>Given I need to be able to do this via the app when I need information for the task then I need to have a specific area to do so on the application. </a:t>
             </a:r>
           </a:p>
           <a:p>
@@ -9936,13 +10730,26 @@
               <a:buChar char="•"/>
             </a:pPr>
             <a:r>
-              <a:rPr lang="en-AU" sz="2000" dirty="0">
-                <a:solidFill>
-                  <a:schemeClr val="tx1"/>
-                </a:solidFill>
-              </a:rPr>
-              <a:t>This area lets me search for students which will generate a form that autofill’s with the student data that can then be changed and saved</a:t>
-            </a:r>
+              <a:rPr lang="en-AU" sz="2000" dirty="0" err="1">
+                <a:solidFill>
+                  <a:schemeClr val="tx1"/>
+                </a:solidFill>
+              </a:rPr>
+              <a:t>Gicen</a:t>
+            </a:r>
+            <a:r>
+              <a:rPr lang="en-AU" sz="2000" dirty="0">
+                <a:solidFill>
+                  <a:schemeClr val="tx1"/>
+                </a:solidFill>
+              </a:rPr>
+              <a:t> I need to be able to search for a student when I am performing a task requiring specific student information then I need to be able to access a generated form with student information that I am also able to change. </a:t>
+            </a:r>
+            <a:endParaRPr lang="en-AU" sz="2000" dirty="0" smtClean="0">
+              <a:solidFill>
+                <a:schemeClr val="tx1"/>
+              </a:solidFill>
+            </a:endParaRPr>
           </a:p>
           <a:p>
             <a:pPr marL="342900" indent="-342900">
@@ -9955,16 +10762,31 @@
                   <a:schemeClr val="tx1"/>
                 </a:solidFill>
               </a:rPr>
-              <a:t>I can also choose to create new student</a:t>
-            </a:r>
-          </a:p>
-          <a:p>
+              <a:t>Given a new student enrols when I am lodging there enrolment then I need to be able to create a new form for that student. </a:t>
+            </a:r>
+          </a:p>
+          <a:p>
+            <a:pPr marL="342900" indent="-342900">
+              <a:buFont typeface="Arial" panose="020B0604020202020204" pitchFamily="34" charset="0"/>
+              <a:buChar char="•"/>
+            </a:pPr>
             <a:endParaRPr lang="en-AU" sz="2000" dirty="0">
               <a:solidFill>
                 <a:schemeClr val="tx1"/>
               </a:solidFill>
             </a:endParaRPr>
           </a:p>
+          <a:p>
+            <a:pPr marL="342900" indent="-342900">
+              <a:buFont typeface="Arial" panose="020B0604020202020204" pitchFamily="34" charset="0"/>
+              <a:buChar char="•"/>
+            </a:pPr>
+            <a:endParaRPr lang="en-AU" sz="2000" dirty="0">
+              <a:solidFill>
+                <a:schemeClr val="tx1"/>
+              </a:solidFill>
+            </a:endParaRPr>
+          </a:p>
         </p:txBody>
       </p:sp>
       <p:sp>
@@ -10105,8 +10927,8 @@
         </p:nvSpPr>
         <p:spPr>
           <a:xfrm>
-            <a:off x="39153" y="5128590"/>
-            <a:ext cx="9828000" cy="1620000"/>
+            <a:off x="77999" y="5989320"/>
+            <a:ext cx="9789153" cy="759270"/>
           </a:xfrm>
           <a:prstGeom prst="rect">
             <a:avLst/>
@@ -10456,7 +11278,39 @@
                   <a:schemeClr val="tx1"/>
                 </a:solidFill>
               </a:rPr>
-              <a:t>The application has a page with a table that displays information for each instrument in rows</a:t>
+              <a:t>Given </a:t>
+            </a:r>
+            <a:r>
+              <a:rPr lang="en-AU" sz="2000" dirty="0" err="1">
+                <a:solidFill>
+                  <a:schemeClr val="tx1"/>
+                </a:solidFill>
+              </a:rPr>
+              <a:t>i</a:t>
+            </a:r>
+            <a:r>
+              <a:rPr lang="en-AU" sz="2000" dirty="0">
+                <a:solidFill>
+                  <a:schemeClr val="tx1"/>
+                </a:solidFill>
+              </a:rPr>
+              <a:t> need to be able to view the instrument information when performing a task </a:t>
+            </a:r>
+            <a:r>
+              <a:rPr lang="en-AU" sz="2000" dirty="0" err="1">
+                <a:solidFill>
+                  <a:schemeClr val="tx1"/>
+                </a:solidFill>
+              </a:rPr>
+              <a:t>reuiring</a:t>
+            </a:r>
+            <a:r>
+              <a:rPr lang="en-AU" sz="2000" dirty="0">
+                <a:solidFill>
+                  <a:schemeClr val="tx1"/>
+                </a:solidFill>
+              </a:rPr>
+              <a:t> the instrument catalogue then the information should be displayed in a way that tables have information for each instrument in rows. </a:t>
             </a:r>
           </a:p>
           <a:p>
@@ -10470,10 +11324,8 @@
                   <a:schemeClr val="tx1"/>
                 </a:solidFill>
               </a:rPr>
-              <a:t>This table can be searched by instrument type, brand, condition. instrument model and instrument serial number</a:t>
-            </a:r>
-          </a:p>
-          <a:p>
+              <a:t>Given I need to be able to search for instrument information when performing a task based on the instrument then I need to be able to search by categories such as instrument type, brand, condition, instrument model and lastly the serial number.</a:t>
+            </a:r>
             <a:endParaRPr lang="en-AU" sz="2000" dirty="0">
               <a:solidFill>
                 <a:schemeClr val="tx1"/>
@@ -11028,7 +11880,23 @@
                   <a:schemeClr val="tx1"/>
                 </a:solidFill>
               </a:rPr>
-              <a:t>I have a professional email address hosted within the application visible to everyone, through which I can get into contact and be contacted by people.</a:t>
+              <a:t>Given I need to be able to receive messages when some one has a query for me specifically then I need to have my own professional email </a:t>
+            </a:r>
+            <a:r>
+              <a:rPr lang="en-AU" sz="2000" dirty="0" err="1">
+                <a:solidFill>
+                  <a:schemeClr val="tx1"/>
+                </a:solidFill>
+              </a:rPr>
+              <a:t>adress</a:t>
+            </a:r>
+            <a:r>
+              <a:rPr lang="en-AU" sz="2000" dirty="0">
+                <a:solidFill>
+                  <a:schemeClr val="tx1"/>
+                </a:solidFill>
+              </a:rPr>
+              <a:t> within the application which must be visible to everyone so I can be contacted as well as contact others. </a:t>
             </a:r>
           </a:p>
         </p:txBody>
@@ -11508,7 +12376,7 @@
                   <a:schemeClr val="tx1"/>
                 </a:solidFill>
               </a:rPr>
-              <a:t>I have access to a feature which allows me to specify and view tables in the database that I wish to see.</a:t>
+              <a:t>Given I need to be able to access specific information and to manage the application  when looking for certain information then I need to have a feature which allows me to view and access the database. </a:t>
             </a:r>
           </a:p>
           <a:p>
@@ -11522,7 +12390,7 @@
                   <a:schemeClr val="tx1"/>
                 </a:solidFill>
               </a:rPr>
-              <a:t>I can use this feature to make changes to information in the database.</a:t>
+              <a:t>Given I need to be able to change information when required then I need to be able to have the ability to change this through an editing feature. </a:t>
             </a:r>
           </a:p>
         </p:txBody>
@@ -12002,7 +12870,7 @@
                   <a:schemeClr val="tx1"/>
                 </a:solidFill>
               </a:rPr>
-              <a:t>I have the ability to email people contracts for their viewing.</a:t>
+              <a:t>Given when I need to issue contracts to teachers/ staff or student when I need to give them contracts then I need to be able to email people these contracts for their viewing. </a:t>
             </a:r>
           </a:p>
           <a:p>
@@ -12016,7 +12884,17 @@
                   <a:schemeClr val="tx1"/>
                 </a:solidFill>
               </a:rPr>
-              <a:t>I have the ability to receive emails.</a:t>
+              <a:t>Given someone needs to contact me regarding there contract when they have a query then I need to be able to have the ability to receive emails regarding this. </a:t>
+            </a:r>
+          </a:p>
+          <a:p>
+            <a:r>
+              <a:rPr lang="en-AU" sz="2000" dirty="0">
+                <a:solidFill>
+                  <a:schemeClr val="tx1"/>
+                </a:solidFill>
+              </a:rPr>
+              <a:t> </a:t>
             </a:r>
           </a:p>
         </p:txBody>
@@ -12914,7 +13792,7 @@
         <p:spPr>
           <a:xfrm>
             <a:off x="39153" y="2603439"/>
-            <a:ext cx="9828000" cy="2352091"/>
+            <a:ext cx="9828000" cy="2951541"/>
           </a:xfrm>
           <a:prstGeom prst="rect">
             <a:avLst/>
@@ -12973,7 +13851,7 @@
                   <a:schemeClr val="tx1"/>
                 </a:solidFill>
               </a:rPr>
-              <a:t>I have a tool where I can specify and view information in the database</a:t>
+              <a:t>Given I need to be able to view information regarding the instruments when looking at what needs upgrading or procuring then I need a tool to allow me to view information in the database. </a:t>
             </a:r>
           </a:p>
           <a:p>
@@ -12987,7 +13865,7 @@
                   <a:schemeClr val="tx1"/>
                 </a:solidFill>
               </a:rPr>
-              <a:t>I can access information in the database related to instruments</a:t>
+              <a:t>Given I need to be able to view information regarding instruments when looking at upgrades and what is needed then I need to be able to have access to the database. </a:t>
             </a:r>
           </a:p>
           <a:p>
@@ -13001,7 +13879,7 @@
                   <a:schemeClr val="tx1"/>
                 </a:solidFill>
               </a:rPr>
-              <a:t>instrument tables in the database contains information in relation to the quantity and condition of instruments</a:t>
+              <a:t>Given I need to be able to view the condition and quantity of the instrument when I need to be able to view a summary of instruments then I need to be able to search the tables in the database containing this information </a:t>
             </a:r>
           </a:p>
         </p:txBody>
@@ -13144,8 +14022,8 @@
         </p:nvSpPr>
         <p:spPr>
           <a:xfrm>
-            <a:off x="39153" y="5128590"/>
-            <a:ext cx="9828000" cy="1620000"/>
+            <a:off x="39153" y="5554980"/>
+            <a:ext cx="9827999" cy="1193610"/>
           </a:xfrm>
           <a:prstGeom prst="rect">
             <a:avLst/>
@@ -13493,8 +14371,8 @@
         </p:nvSpPr>
         <p:spPr>
           <a:xfrm>
-            <a:off x="39153" y="2603439"/>
-            <a:ext cx="9828000" cy="2642329"/>
+            <a:off x="0" y="2603439"/>
+            <a:ext cx="9867153" cy="3650381"/>
           </a:xfrm>
           <a:prstGeom prst="rect">
             <a:avLst/>
@@ -13539,8 +14417,29 @@
                   <a:schemeClr val="tx1"/>
                 </a:solidFill>
               </a:rPr>
-              <a:t>Acceptance Criteria</a:t>
-            </a:r>
+              <a:t>Acceptance </a:t>
+            </a:r>
+            <a:r>
+              <a:rPr lang="en-AU" sz="2000" dirty="0" smtClean="0">
+                <a:solidFill>
+                  <a:schemeClr val="tx1"/>
+                </a:solidFill>
+              </a:rPr>
+              <a:t>Criteria</a:t>
+            </a:r>
+            <a:r>
+              <a:rPr lang="en-AU" sz="2000" dirty="0" smtClean="0">
+                <a:solidFill>
+                  <a:schemeClr val="tx1"/>
+                </a:solidFill>
+              </a:rPr>
+              <a:t>. </a:t>
+            </a:r>
+            <a:endParaRPr lang="en-AU" sz="2000" dirty="0">
+              <a:solidFill>
+                <a:schemeClr val="tx1"/>
+              </a:solidFill>
+            </a:endParaRPr>
           </a:p>
           <a:p>
             <a:pPr marL="342900" indent="-342900">
@@ -13553,64 +14452,189 @@
                   <a:schemeClr val="tx1"/>
                 </a:solidFill>
               </a:rPr>
-              <a:t>Child and parent accounts should be the same and feature the same information and functionality</a:t>
-            </a:r>
-          </a:p>
-          <a:p>
-            <a:pPr marL="342900" indent="-342900">
+              <a:t> </a:t>
+            </a:r>
+            <a:r>
+              <a:rPr lang="en-AU" dirty="0">
+                <a:solidFill>
+                  <a:schemeClr val="tx1"/>
+                </a:solidFill>
+              </a:rPr>
+              <a:t>Given I need to be able to view the same information as my child when looking at times, locations </a:t>
+            </a:r>
+            <a:r>
+              <a:rPr lang="en-AU" dirty="0" err="1">
+                <a:solidFill>
+                  <a:schemeClr val="tx1"/>
+                </a:solidFill>
+              </a:rPr>
+              <a:t>etc</a:t>
+            </a:r>
+            <a:r>
+              <a:rPr lang="en-AU" dirty="0">
+                <a:solidFill>
+                  <a:schemeClr val="tx1"/>
+                </a:solidFill>
+              </a:rPr>
+              <a:t> then I need to have my own </a:t>
+            </a:r>
+            <a:r>
+              <a:rPr lang="en-AU" dirty="0" err="1">
+                <a:solidFill>
+                  <a:schemeClr val="tx1"/>
+                </a:solidFill>
+              </a:rPr>
+              <a:t>acount</a:t>
+            </a:r>
+            <a:r>
+              <a:rPr lang="en-AU" dirty="0">
+                <a:solidFill>
+                  <a:schemeClr val="tx1"/>
+                </a:solidFill>
+              </a:rPr>
+              <a:t> with the same information and functionality. </a:t>
+            </a:r>
+          </a:p>
+          <a:p>
+            <a:pPr marL="285750" indent="-285750">
               <a:buFont typeface="Arial" panose="020B0604020202020204" pitchFamily="34" charset="0"/>
               <a:buChar char="•"/>
             </a:pPr>
             <a:r>
-              <a:rPr lang="en-AU" sz="2000" dirty="0">
-                <a:solidFill>
-                  <a:schemeClr val="tx1"/>
-                </a:solidFill>
-              </a:rPr>
-              <a:t>There is one account shared with me and my child</a:t>
-            </a:r>
-          </a:p>
-          <a:p>
-            <a:pPr marL="342900" indent="-342900">
+              <a:rPr lang="en-AU" dirty="0">
+                <a:solidFill>
+                  <a:schemeClr val="tx1"/>
+                </a:solidFill>
+              </a:rPr>
+              <a:t>Given I need to be able to view the same as my child when looking at information needed then my account should be the same as my </a:t>
+            </a:r>
+            <a:r>
+              <a:rPr lang="en-AU" dirty="0" err="1">
+                <a:solidFill>
+                  <a:schemeClr val="tx1"/>
+                </a:solidFill>
+              </a:rPr>
+              <a:t>childs</a:t>
+            </a:r>
+            <a:r>
+              <a:rPr lang="en-AU" dirty="0">
+                <a:solidFill>
+                  <a:schemeClr val="tx1"/>
+                </a:solidFill>
+              </a:rPr>
+              <a:t> and have a shared account. </a:t>
+            </a:r>
+          </a:p>
+          <a:p>
+            <a:pPr marL="285750" indent="-285750">
               <a:buFont typeface="Arial" panose="020B0604020202020204" pitchFamily="34" charset="0"/>
               <a:buChar char="•"/>
             </a:pPr>
             <a:r>
-              <a:rPr lang="en-AU" sz="2000" dirty="0">
-                <a:solidFill>
-                  <a:schemeClr val="tx1"/>
-                </a:solidFill>
-              </a:rPr>
-              <a:t>The accounts display all previous appointments booked and whether they were attended or not</a:t>
-            </a:r>
-          </a:p>
-          <a:p>
-            <a:pPr marL="342900" indent="-342900">
+              <a:rPr lang="en-AU" dirty="0">
+                <a:solidFill>
+                  <a:schemeClr val="tx1"/>
+                </a:solidFill>
+              </a:rPr>
+              <a:t>Given I need to be able to view appointments when I am looking at information needed for another appointment or in general then I need to be able to view these appointments/ classes and </a:t>
+            </a:r>
+            <a:r>
+              <a:rPr lang="en-AU" dirty="0" err="1">
+                <a:solidFill>
+                  <a:schemeClr val="tx1"/>
+                </a:solidFill>
+              </a:rPr>
+              <a:t>whethere</a:t>
+            </a:r>
+            <a:r>
+              <a:rPr lang="en-AU" dirty="0">
+                <a:solidFill>
+                  <a:schemeClr val="tx1"/>
+                </a:solidFill>
+              </a:rPr>
+              <a:t> my child or I attended or not. </a:t>
+            </a:r>
+          </a:p>
+          <a:p>
+            <a:pPr marL="285750" indent="-285750">
               <a:buFont typeface="Arial" panose="020B0604020202020204" pitchFamily="34" charset="0"/>
               <a:buChar char="•"/>
             </a:pPr>
             <a:r>
-              <a:rPr lang="en-AU" sz="2000" dirty="0">
-                <a:solidFill>
-                  <a:schemeClr val="tx1"/>
-                </a:solidFill>
-              </a:rPr>
-              <a:t>User accounts display my child's average grade</a:t>
-            </a:r>
-          </a:p>
-          <a:p>
-            <a:pPr marL="342900" indent="-342900">
+              <a:rPr lang="en-AU" dirty="0">
+                <a:solidFill>
+                  <a:schemeClr val="tx1"/>
+                </a:solidFill>
+              </a:rPr>
+              <a:t>Given I need to keep track of my </a:t>
+            </a:r>
+            <a:r>
+              <a:rPr lang="en-AU" dirty="0" err="1">
+                <a:solidFill>
+                  <a:schemeClr val="tx1"/>
+                </a:solidFill>
+              </a:rPr>
+              <a:t>childs</a:t>
+            </a:r>
+            <a:r>
+              <a:rPr lang="en-AU" dirty="0">
+                <a:solidFill>
+                  <a:schemeClr val="tx1"/>
+                </a:solidFill>
+              </a:rPr>
+              <a:t> project when looking at whether my child should stay in the school then I need to be able to view my </a:t>
+            </a:r>
+            <a:r>
+              <a:rPr lang="en-AU" dirty="0" err="1">
+                <a:solidFill>
+                  <a:schemeClr val="tx1"/>
+                </a:solidFill>
+              </a:rPr>
+              <a:t>childs</a:t>
+            </a:r>
+            <a:r>
+              <a:rPr lang="en-AU" dirty="0">
+                <a:solidFill>
+                  <a:schemeClr val="tx1"/>
+                </a:solidFill>
+              </a:rPr>
+              <a:t> average grade. </a:t>
+            </a:r>
+          </a:p>
+          <a:p>
+            <a:pPr marL="285750" indent="-285750">
               <a:buFont typeface="Arial" panose="020B0604020202020204" pitchFamily="34" charset="0"/>
               <a:buChar char="•"/>
             </a:pPr>
             <a:r>
-              <a:rPr lang="en-AU" sz="2000" dirty="0">
-                <a:solidFill>
-                  <a:schemeClr val="tx1"/>
-                </a:solidFill>
-              </a:rPr>
-              <a:t>The account has the ability to book lessons</a:t>
-            </a:r>
+              <a:rPr lang="en-AU" dirty="0">
+                <a:solidFill>
+                  <a:schemeClr val="tx1"/>
+                </a:solidFill>
+              </a:rPr>
+              <a:t>Given I need to be able to help my child book appointments and let my child book appointments when looking into when my child can </a:t>
+            </a:r>
+            <a:r>
+              <a:rPr lang="en-AU" dirty="0" err="1">
+                <a:solidFill>
+                  <a:schemeClr val="tx1"/>
+                </a:solidFill>
+              </a:rPr>
+              <a:t>atten</a:t>
+            </a:r>
+            <a:r>
+              <a:rPr lang="en-AU" dirty="0">
+                <a:solidFill>
+                  <a:schemeClr val="tx1"/>
+                </a:solidFill>
+              </a:rPr>
+              <a:t> then I need to be able to book </a:t>
+            </a:r>
+            <a:endParaRPr lang="en-AU" dirty="0">
+              <a:solidFill>
+                <a:schemeClr val="tx1"/>
+              </a:solidFill>
+            </a:endParaRPr>
           </a:p>
         </p:txBody>
       </p:sp>
@@ -13752,8 +14776,8 @@
         </p:nvSpPr>
         <p:spPr>
           <a:xfrm>
-            <a:off x="39153" y="5366084"/>
-            <a:ext cx="9828000" cy="1382506"/>
+            <a:off x="0" y="6253820"/>
+            <a:ext cx="9867153" cy="494770"/>
           </a:xfrm>
           <a:prstGeom prst="rect">
             <a:avLst/>
@@ -14089,7 +15113,7 @@
                   <a:schemeClr val="tx1"/>
                 </a:solidFill>
               </a:rPr>
-              <a:t>My phone number and email are tied to my account</a:t>
+              <a:t>Given that I need to be able to be contacted when something is wrong with my child then I need to have my email and number tied to the account. </a:t>
             </a:r>
           </a:p>
           <a:p>
@@ -14103,7 +15127,7 @@
                   <a:schemeClr val="tx1"/>
                 </a:solidFill>
               </a:rPr>
-              <a:t>The teachers should be able to easily obtain my contact info from their account</a:t>
+              <a:t>Given that teachers may need to contact me when they have questions or issues then they need to be able to access my contact details. </a:t>
             </a:r>
           </a:p>
           <a:p>
@@ -14117,7 +15141,7 @@
                   <a:schemeClr val="tx1"/>
                 </a:solidFill>
               </a:rPr>
-              <a:t>I shouldn't be able to make an account unless all my details are on the system</a:t>
+              <a:t>Given security reasons when I need to create an account then I should only be able to do this when all of my details are on the system. </a:t>
             </a:r>
           </a:p>
         </p:txBody>
@@ -14537,8 +15561,8 @@
         </p:nvSpPr>
         <p:spPr>
           <a:xfrm>
-            <a:off x="39153" y="2603439"/>
-            <a:ext cx="9828000" cy="2642329"/>
+            <a:off x="0" y="2603439"/>
+            <a:ext cx="9867153" cy="2815389"/>
           </a:xfrm>
           <a:prstGeom prst="rect">
             <a:avLst/>
@@ -14597,7 +15621,7 @@
                   <a:schemeClr val="tx1"/>
                 </a:solidFill>
               </a:rPr>
-              <a:t>My phone number and email are tied to my account</a:t>
+              <a:t>Given  I need to be able to lodge my contact details when using the account then I should be able to do this through the account. </a:t>
             </a:r>
           </a:p>
           <a:p>
@@ -14611,7 +15635,7 @@
                   <a:schemeClr val="tx1"/>
                 </a:solidFill>
               </a:rPr>
-              <a:t>I should be able to enter emergency contact details for my child when I sign up</a:t>
+              <a:t>Given I need to be able to contacted during an emergency when there is an emergency then I need to be able to add emergency contact details for myself and another when I sign up. </a:t>
             </a:r>
           </a:p>
           <a:p>
@@ -14625,7 +15649,7 @@
                   <a:schemeClr val="tx1"/>
                 </a:solidFill>
               </a:rPr>
-              <a:t>I also need to be able to get staff and administration contact details as a printable document</a:t>
+              <a:t>Given I need to be able to get the contact details of staff and admin when looking to contact staff then I need to be able to gain this contact information in an easy format then can be both on the app and printable. </a:t>
             </a:r>
           </a:p>
         </p:txBody>
@@ -14768,8 +15792,8 @@
         </p:nvSpPr>
         <p:spPr>
           <a:xfrm>
-            <a:off x="39153" y="5366084"/>
-            <a:ext cx="9828000" cy="1382506"/>
+            <a:off x="77999" y="5418828"/>
+            <a:ext cx="9789153" cy="1329762"/>
           </a:xfrm>
           <a:prstGeom prst="rect">
             <a:avLst/>
@@ -17456,8 +18480,8 @@
         </p:nvSpPr>
         <p:spPr>
           <a:xfrm>
-            <a:off x="39153" y="3335530"/>
-            <a:ext cx="9828000" cy="1620000"/>
+            <a:off x="0" y="3335530"/>
+            <a:ext cx="9867153" cy="1830830"/>
           </a:xfrm>
           <a:prstGeom prst="rect">
             <a:avLst/>
@@ -17502,8 +18526,21 @@
                   <a:schemeClr val="tx1"/>
                 </a:solidFill>
               </a:rPr>
-              <a:t>Acceptance Criteria</a:t>
-            </a:r>
+              <a:t>Acceptance </a:t>
+            </a:r>
+            <a:r>
+              <a:rPr lang="en-AU" sz="2000" dirty="0" smtClean="0">
+                <a:solidFill>
+                  <a:schemeClr val="tx1"/>
+                </a:solidFill>
+              </a:rPr>
+              <a:t>Criteria</a:t>
+            </a:r>
+            <a:endParaRPr lang="en-AU" sz="2000" dirty="0">
+              <a:solidFill>
+                <a:schemeClr val="tx1"/>
+              </a:solidFill>
+            </a:endParaRPr>
           </a:p>
           <a:p>
             <a:pPr marL="342900" indent="-342900">
@@ -17511,12 +18548,36 @@
               <a:buChar char="•"/>
             </a:pPr>
             <a:r>
-              <a:rPr lang="en-AU" sz="2000" dirty="0">
-                <a:solidFill>
-                  <a:schemeClr val="tx1"/>
-                </a:solidFill>
-              </a:rPr>
-              <a:t>Given a student/parent wants to contact an administrator/teacher </a:t>
+              <a:rPr lang="en-AU" sz="2000" dirty="0" smtClean="0">
+                <a:solidFill>
+                  <a:schemeClr val="tx1"/>
+                </a:solidFill>
+              </a:rPr>
+              <a:t>Given </a:t>
+            </a:r>
+            <a:r>
+              <a:rPr lang="en-AU" sz="2000" dirty="0">
+                <a:solidFill>
+                  <a:schemeClr val="tx1"/>
+                </a:solidFill>
+              </a:rPr>
+              <a:t>a student/parent wants to contact an administrator/teacher </a:t>
+            </a:r>
+            <a:r>
+              <a:rPr lang="en-AU" sz="2000" dirty="0" smtClean="0">
+                <a:solidFill>
+                  <a:schemeClr val="tx1"/>
+                </a:solidFill>
+              </a:rPr>
+              <a:t>When </a:t>
+            </a:r>
+            <a:r>
+              <a:rPr lang="en-AU" sz="2000" dirty="0">
+                <a:solidFill>
+                  <a:schemeClr val="tx1"/>
+                </a:solidFill>
+              </a:rPr>
+              <a:t>an issue arises</a:t>
             </a:r>
           </a:p>
           <a:p>
@@ -17527,30 +18588,61 @@
                   <a:schemeClr val="tx1"/>
                 </a:solidFill>
               </a:rPr>
-              <a:t>When an issue arises</a:t>
-            </a:r>
-          </a:p>
-          <a:p>
-            <a:pPr lvl="1"/>
-            <a:r>
-              <a:rPr lang="en-AU" sz="2000" dirty="0">
-                <a:solidFill>
-                  <a:schemeClr val="tx1"/>
-                </a:solidFill>
-              </a:rPr>
-              <a:t>When a time needs to be changed</a:t>
-            </a:r>
-          </a:p>
-          <a:p>
-            <a:pPr lvl="1"/>
-            <a:r>
-              <a:rPr lang="en-AU" sz="2000" dirty="0">
-                <a:solidFill>
-                  <a:schemeClr val="tx1"/>
-                </a:solidFill>
-              </a:rPr>
-              <a:t>Then they can contact someone and change bookings</a:t>
-            </a:r>
+              <a:t>When a time needs to be </a:t>
+            </a:r>
+            <a:r>
+              <a:rPr lang="en-AU" sz="2000" dirty="0" err="1" smtClean="0">
+                <a:solidFill>
+                  <a:schemeClr val="tx1"/>
+                </a:solidFill>
+              </a:rPr>
+              <a:t>changedThen</a:t>
+            </a:r>
+            <a:r>
+              <a:rPr lang="en-AU" sz="2000" dirty="0" smtClean="0">
+                <a:solidFill>
+                  <a:schemeClr val="tx1"/>
+                </a:solidFill>
+              </a:rPr>
+              <a:t> </a:t>
+            </a:r>
+            <a:r>
+              <a:rPr lang="en-AU" sz="2000" dirty="0">
+                <a:solidFill>
+                  <a:schemeClr val="tx1"/>
+                </a:solidFill>
+              </a:rPr>
+              <a:t>they can contact someone and change bookings</a:t>
+            </a:r>
+          </a:p>
+          <a:p>
+            <a:pPr marL="342900" indent="-342900">
+              <a:buFont typeface="Arial" panose="020B0604020202020204" pitchFamily="34" charset="0"/>
+              <a:buChar char="•"/>
+            </a:pPr>
+            <a:r>
+              <a:rPr lang="en-AU" sz="2000" dirty="0">
+                <a:solidFill>
+                  <a:schemeClr val="tx1"/>
+                </a:solidFill>
+              </a:rPr>
+              <a:t>Given a student/ parent wants to contact and administrator/ teacher when an issue arises then they can access contact </a:t>
+            </a:r>
+            <a:r>
+              <a:rPr lang="en-AU" sz="2000" dirty="0"/>
+              <a:t>details through the application. </a:t>
+            </a:r>
+          </a:p>
+          <a:p>
+            <a:pPr marL="342900" indent="-342900">
+              <a:buFont typeface="Arial" panose="020B0604020202020204" pitchFamily="34" charset="0"/>
+              <a:buChar char="•"/>
+            </a:pPr>
+            <a:endParaRPr lang="en-AU" sz="2000" dirty="0">
+              <a:solidFill>
+                <a:schemeClr val="tx1"/>
+              </a:solidFill>
+            </a:endParaRPr>
           </a:p>
           <a:p>
             <a:pPr marL="179388" indent="-179388">
@@ -17563,17 +18655,6 @@
               </a:solidFill>
             </a:endParaRPr>
           </a:p>
-          <a:p>
-            <a:pPr marL="179388" indent="-179388">
-              <a:buFont typeface="Arial" pitchFamily="34" charset="0"/>
-              <a:buChar char="•"/>
-            </a:pPr>
-            <a:endParaRPr lang="en-AU" sz="2000" dirty="0">
-              <a:solidFill>
-                <a:schemeClr val="tx1"/>
-              </a:solidFill>
-            </a:endParaRPr>
-          </a:p>
         </p:txBody>
       </p:sp>
       <p:sp>
@@ -17714,8 +18795,8 @@
         </p:nvSpPr>
         <p:spPr>
           <a:xfrm>
-            <a:off x="39153" y="5128590"/>
-            <a:ext cx="9828000" cy="1620000"/>
+            <a:off x="39153" y="5463540"/>
+            <a:ext cx="9828000" cy="1285050"/>
           </a:xfrm>
           <a:prstGeom prst="rect">
             <a:avLst/>
@@ -18045,32 +19126,40 @@
               </a:rPr>
               <a:t> Given a student/parent wants to find a well suited teacher </a:t>
             </a:r>
-          </a:p>
-          <a:p>
-            <a:r>
-              <a:rPr lang="en-AU" sz="2000" dirty="0">
-                <a:solidFill>
-                  <a:schemeClr val="tx1"/>
-                </a:solidFill>
-              </a:rPr>
-              <a:t>    When searching for teachers</a:t>
-            </a:r>
-          </a:p>
-          <a:p>
-            <a:r>
-              <a:rPr lang="en-AU" sz="2000" dirty="0">
-                <a:solidFill>
-                  <a:schemeClr val="tx1"/>
-                </a:solidFill>
-              </a:rPr>
-              <a:t>    Then they can search for them</a:t>
-            </a:r>
-          </a:p>
-          <a:p>
-            <a:pPr marL="179388" indent="-179388">
-              <a:buFont typeface="Arial" pitchFamily="34" charset="0"/>
-              <a:buChar char="•"/>
-            </a:pPr>
+            <a:r>
+              <a:rPr lang="en-AU" sz="2000" dirty="0" smtClean="0">
+                <a:solidFill>
+                  <a:schemeClr val="tx1"/>
+                </a:solidFill>
+              </a:rPr>
+              <a:t>When </a:t>
+            </a:r>
+            <a:r>
+              <a:rPr lang="en-AU" sz="2000" dirty="0">
+                <a:solidFill>
+                  <a:schemeClr val="tx1"/>
+                </a:solidFill>
+              </a:rPr>
+              <a:t>searching for teachers</a:t>
+            </a:r>
+          </a:p>
+          <a:p>
+            <a:r>
+              <a:rPr lang="en-AU" sz="2000" dirty="0">
+                <a:solidFill>
+                  <a:schemeClr val="tx1"/>
+                </a:solidFill>
+              </a:rPr>
+              <a:t>    Then they can search for </a:t>
+            </a:r>
+            <a:r>
+              <a:rPr lang="en-AU" sz="2000" dirty="0" smtClean="0">
+                <a:solidFill>
+                  <a:schemeClr val="tx1"/>
+                </a:solidFill>
+              </a:rPr>
+              <a:t>them</a:t>
+            </a:r>
             <a:endParaRPr lang="en-AU" sz="2000" dirty="0">
               <a:solidFill>
                 <a:schemeClr val="tx1"/>
@@ -18217,7 +19306,7 @@
         </p:nvSpPr>
         <p:spPr>
           <a:xfrm>
-            <a:off x="39153" y="5128590"/>
+            <a:off x="0" y="5117324"/>
             <a:ext cx="9828000" cy="1620000"/>
           </a:xfrm>
           <a:prstGeom prst="rect">
@@ -19020,27 +20109,60 @@
                   <a:schemeClr val="tx1"/>
                 </a:solidFill>
               </a:rPr>
-              <a:t>Given a student/parent wants to view an ordered timetable </a:t>
-            </a:r>
-          </a:p>
-          <a:p>
-            <a:r>
-              <a:rPr lang="en-AU" sz="2000" dirty="0">
-                <a:solidFill>
-                  <a:schemeClr val="tx1"/>
-                </a:solidFill>
-              </a:rPr>
-              <a:t>    When looking for a certain criterion</a:t>
-            </a:r>
-          </a:p>
-          <a:p>
-            <a:r>
-              <a:rPr lang="en-AU" sz="2000" dirty="0">
-                <a:solidFill>
-                  <a:schemeClr val="tx1"/>
-                </a:solidFill>
-              </a:rPr>
-              <a:t>    Then they can find the necessary tools</a:t>
+              <a:t>Given a student wants to access the timetable at anytime when either enrolled or looking for classes then they can access a timetable through the application. </a:t>
+            </a:r>
+            <a:endParaRPr lang="en-AU" sz="2000" dirty="0" smtClean="0">
+              <a:solidFill>
+                <a:schemeClr val="tx1"/>
+              </a:solidFill>
+            </a:endParaRPr>
+          </a:p>
+          <a:p>
+            <a:pPr marL="179388" indent="-179388">
+              <a:buFont typeface="Arial" pitchFamily="34" charset="0"/>
+              <a:buChar char="•"/>
+            </a:pPr>
+            <a:r>
+              <a:rPr lang="en-AU" sz="2000" dirty="0" smtClean="0">
+                <a:solidFill>
+                  <a:schemeClr val="tx1"/>
+                </a:solidFill>
+              </a:rPr>
+              <a:t>Given </a:t>
+            </a:r>
+            <a:r>
+              <a:rPr lang="en-AU" sz="2000" dirty="0">
+                <a:solidFill>
+                  <a:schemeClr val="tx1"/>
+                </a:solidFill>
+              </a:rPr>
+              <a:t>a student/parent wants to view an ordered timetable </a:t>
+            </a:r>
+          </a:p>
+          <a:p>
+            <a:r>
+              <a:rPr lang="en-AU" sz="2000" dirty="0">
+                <a:solidFill>
+                  <a:schemeClr val="tx1"/>
+                </a:solidFill>
+              </a:rPr>
+              <a:t>    When looking for a certain </a:t>
+            </a:r>
+            <a:r>
+              <a:rPr lang="en-AU" sz="2000" dirty="0" smtClean="0">
+                <a:solidFill>
+                  <a:schemeClr val="tx1"/>
+                </a:solidFill>
+              </a:rPr>
+              <a:t>criterion Then </a:t>
+            </a:r>
+            <a:r>
+              <a:rPr lang="en-AU" sz="2000" dirty="0">
+                <a:solidFill>
+                  <a:schemeClr val="tx1"/>
+                </a:solidFill>
+              </a:rPr>
+              <a:t>they can find the necessary tools</a:t>
             </a:r>
           </a:p>
           <a:p>
@@ -20019,4 +21141,265 @@
   <a:objectDefaults/>
   <a:extraClrSchemeLst/>
 </a:theme>
+</file>
+
+<file path=ppt/theme/theme2.xml><?xml version="1.0" encoding="utf-8"?>
+<a:theme xmlns:a="http://schemas.openxmlformats.org/drawingml/2006/main" name="Office Theme">
+  <a:themeElements>
+    <a:clrScheme name="Office">
+      <a:dk1>
+        <a:sysClr val="windowText" lastClr="000000"/>
+      </a:dk1>
+      <a:lt1>
+        <a:sysClr val="window" lastClr="FFFFFF"/>
+      </a:lt1>
+      <a:dk2>
+        <a:srgbClr val="44546A"/>
+      </a:dk2>
+      <a:lt2>
+        <a:srgbClr val="E7E6E6"/>
+      </a:lt2>
+      <a:accent1>
+        <a:srgbClr val="5B9BD5"/>
+      </a:accent1>
+      <a:accent2>
+        <a:srgbClr val="ED7D31"/>
+      </a:accent2>
+      <a:accent3>
+        <a:srgbClr val="A5A5A5"/>
+      </a:accent3>
+      <a:accent4>
+        <a:srgbClr val="FFC000"/>
+      </a:accent4>
+      <a:accent5>
+        <a:srgbClr val="4472C4"/>
+      </a:accent5>
+      <a:accent6>
+        <a:srgbClr val="70AD47"/>
+      </a:accent6>
+      <a:hlink>
+        <a:srgbClr val="0563C1"/>
+      </a:hlink>
+      <a:folHlink>
+        <a:srgbClr val="954F72"/>
+      </a:folHlink>
+    </a:clrScheme>
+    <a:fontScheme name="Office">
+      <a:majorFont>
+        <a:latin typeface="Calibri Light" panose="020F0302020204030204"/>
+        <a:ea typeface=""/>
+        <a:cs typeface=""/>
+        <a:font script="Jpan" typeface="ＭＳ Ｐゴシック"/>
+        <a:font script="Hang" typeface="맑은 고딕"/>
+        <a:font script="Hans" typeface="宋体"/>
+        <a:font script="Hant" typeface="新細明體"/>
+        <a:font script="Arab" typeface="Times New Roman"/>
+        <a:font script="Hebr" typeface="Times New Roman"/>
+        <a:font script="Thai" typeface="Angsana New"/>
+        <a:font script="Ethi" typeface="Nyala"/>
+        <a:font script="Beng" typeface="Vrinda"/>
+        <a:font script="Gujr" typeface="Shruti"/>
+        <a:font script="Khmr" typeface="MoolBoran"/>
+        <a:font script="Knda" typeface="Tunga"/>
+        <a:font script="Guru" typeface="Raavi"/>
+        <a:font script="Cans" typeface="Euphemia"/>
+        <a:font script="Cher" typeface="Plantagenet Cherokee"/>
+        <a:font script="Yiii" typeface="Microsoft Yi Baiti"/>
+        <a:font script="Tibt" typeface="Microsoft Himalaya"/>
+        <a:font script="Thaa" typeface="MV Boli"/>
+        <a:font script="Deva" typeface="Mangal"/>
+        <a:font script="Telu" typeface="Gautami"/>
+        <a:font script="Taml" typeface="Latha"/>
+        <a:font script="Syrc" typeface="Estrangelo Edessa"/>
+        <a:font script="Orya" typeface="Kalinga"/>
+        <a:font script="Mlym" typeface="Kartika"/>
+        <a:font script="Laoo" typeface="DokChampa"/>
+        <a:font script="Sinh" typeface="Iskoola Pota"/>
+        <a:font script="Mong" typeface="Mongolian Baiti"/>
+        <a:font script="Viet" typeface="Times New Roman"/>
+        <a:font script="Uigh" typeface="Microsoft Uighur"/>
+        <a:font script="Geor" typeface="Sylfaen"/>
+      </a:majorFont>
+      <a:minorFont>
+        <a:latin typeface="Calibri" panose="020F0502020204030204"/>
+        <a:ea typeface=""/>
+        <a:cs typeface=""/>
+        <a:font script="Jpan" typeface="ＭＳ Ｐゴシック"/>
+        <a:font script="Hang" typeface="맑은 고딕"/>
+        <a:font script="Hans" typeface="宋体"/>
+        <a:font script="Hant" typeface="新細明體"/>
+        <a:font script="Arab" typeface="Arial"/>
+        <a:font script="Hebr" typeface="Arial"/>
+        <a:font script="Thai" typeface="Cordia New"/>
+        <a:font script="Ethi" typeface="Nyala"/>
+        <a:font script="Beng" typeface="Vrinda"/>
+        <a:font script="Gujr" typeface="Shruti"/>
+        <a:font script="Khmr" typeface="DaunPenh"/>
+        <a:font script="Knda" typeface="Tunga"/>
+        <a:font script="Guru" typeface="Raavi"/>
+        <a:font script="Cans" typeface="Euphemia"/>
+        <a:font script="Cher" typeface="Plantagenet Cherokee"/>
+        <a:font script="Yiii" typeface="Microsoft Yi Baiti"/>
+        <a:font script="Tibt" typeface="Microsoft Himalaya"/>
+        <a:font script="Thaa" typeface="MV Boli"/>
+        <a:font script="Deva" typeface="Mangal"/>
+        <a:font script="Telu" typeface="Gautami"/>
+        <a:font script="Taml" typeface="Latha"/>
+        <a:font script="Syrc" typeface="Estrangelo Edessa"/>
+        <a:font script="Orya" typeface="Kalinga"/>
+        <a:font script="Mlym" typeface="Kartika"/>
+        <a:font script="Laoo" typeface="DokChampa"/>
+        <a:font script="Sinh" typeface="Iskoola Pota"/>
+        <a:font script="Mong" typeface="Mongolian Baiti"/>
+        <a:font script="Viet" typeface="Arial"/>
+        <a:font script="Uigh" typeface="Microsoft Uighur"/>
+        <a:font script="Geor" typeface="Sylfaen"/>
+      </a:minorFont>
+    </a:fontScheme>
+    <a:fmtScheme name="Office">
+      <a:fillStyleLst>
+        <a:solidFill>
+          <a:schemeClr val="phClr"/>
+        </a:solidFill>
+        <a:gradFill rotWithShape="1">
+          <a:gsLst>
+            <a:gs pos="0">
+              <a:schemeClr val="phClr">
+                <a:lumMod val="110000"/>
+                <a:satMod val="105000"/>
+                <a:tint val="67000"/>
+              </a:schemeClr>
+            </a:gs>
+            <a:gs pos="50000">
+              <a:schemeClr val="phClr">
+                <a:lumMod val="105000"/>
+                <a:satMod val="103000"/>
+                <a:tint val="73000"/>
+              </a:schemeClr>
+            </a:gs>
+            <a:gs pos="100000">
+              <a:schemeClr val="phClr">
+                <a:lumMod val="105000"/>
+                <a:satMod val="109000"/>
+                <a:tint val="81000"/>
+              </a:schemeClr>
+            </a:gs>
+          </a:gsLst>
+          <a:lin ang="5400000" scaled="0"/>
+        </a:gradFill>
+        <a:gradFill rotWithShape="1">
+          <a:gsLst>
+            <a:gs pos="0">
+              <a:schemeClr val="phClr">
+                <a:satMod val="103000"/>
+                <a:lumMod val="102000"/>
+                <a:tint val="94000"/>
+              </a:schemeClr>
+            </a:gs>
+            <a:gs pos="50000">
+              <a:schemeClr val="phClr">
+                <a:satMod val="110000"/>
+                <a:lumMod val="100000"/>
+                <a:shade val="100000"/>
+              </a:schemeClr>
+            </a:gs>
+            <a:gs pos="100000">
+              <a:schemeClr val="phClr">
+                <a:lumMod val="99000"/>
+                <a:satMod val="120000"/>
+                <a:shade val="78000"/>
+              </a:schemeClr>
+            </a:gs>
+          </a:gsLst>
+          <a:lin ang="5400000" scaled="0"/>
+        </a:gradFill>
+      </a:fillStyleLst>
+      <a:lnStyleLst>
+        <a:ln w="6350" cap="flat" cmpd="sng" algn="ctr">
+          <a:solidFill>
+            <a:schemeClr val="phClr"/>
+          </a:solidFill>
+          <a:prstDash val="solid"/>
+          <a:miter lim="800000"/>
+        </a:ln>
+        <a:ln w="12700" cap="flat" cmpd="sng" algn="ctr">
+          <a:solidFill>
+            <a:schemeClr val="phClr"/>
+          </a:solidFill>
+          <a:prstDash val="solid"/>
+          <a:miter lim="800000"/>
+        </a:ln>
+        <a:ln w="19050" cap="flat" cmpd="sng" algn="ctr">
+          <a:solidFill>
+            <a:schemeClr val="phClr"/>
+          </a:solidFill>
+          <a:prstDash val="solid"/>
+          <a:miter lim="800000"/>
+        </a:ln>
+      </a:lnStyleLst>
+      <a:effectStyleLst>
+        <a:effectStyle>
+          <a:effectLst/>
+        </a:effectStyle>
+        <a:effectStyle>
+          <a:effectLst/>
+        </a:effectStyle>
+        <a:effectStyle>
+          <a:effectLst>
+            <a:outerShdw blurRad="57150" dist="19050" dir="5400000" algn="ctr" rotWithShape="0">
+              <a:srgbClr val="000000">
+                <a:alpha val="63000"/>
+              </a:srgbClr>
+            </a:outerShdw>
+          </a:effectLst>
+        </a:effectStyle>
+      </a:effectStyleLst>
+      <a:bgFillStyleLst>
+        <a:solidFill>
+          <a:schemeClr val="phClr"/>
+        </a:solidFill>
+        <a:solidFill>
+          <a:schemeClr val="phClr">
+            <a:tint val="95000"/>
+            <a:satMod val="170000"/>
+          </a:schemeClr>
+        </a:solidFill>
+        <a:gradFill rotWithShape="1">
+          <a:gsLst>
+            <a:gs pos="0">
+              <a:schemeClr val="phClr">
+                <a:tint val="93000"/>
+                <a:satMod val="150000"/>
+                <a:shade val="98000"/>
+                <a:lumMod val="102000"/>
+              </a:schemeClr>
+            </a:gs>
+            <a:gs pos="50000">
+              <a:schemeClr val="phClr">
+                <a:tint val="98000"/>
+                <a:satMod val="130000"/>
+                <a:shade val="90000"/>
+                <a:lumMod val="103000"/>
+              </a:schemeClr>
+            </a:gs>
+            <a:gs pos="100000">
+              <a:schemeClr val="phClr">
+                <a:shade val="63000"/>
+                <a:satMod val="120000"/>
+              </a:schemeClr>
+            </a:gs>
+          </a:gsLst>
+          <a:lin ang="5400000" scaled="0"/>
+        </a:gradFill>
+      </a:bgFillStyleLst>
+    </a:fmtScheme>
+  </a:themeElements>
+  <a:objectDefaults/>
+  <a:extraClrSchemeLst/>
+  <a:extLst>
+    <a:ext uri="{05A4C25C-085E-4340-85A3-A5531E510DB2}">
+      <thm15:themeFamily xmlns:thm15="http://schemas.microsoft.com/office/thememl/2012/main" name="Office Theme" id="{62F939B6-93AF-4DB8-9C6B-D6C7DFDC589F}" vid="{4A3C46E8-61CC-4603-A589-7422A47A8E4A}"/>
+    </a:ext>
+  </a:extLst>
+</a:theme>
 </file>
</xml_diff>